<commit_message>
Minify JavAScript subfolders change per Technisoft
</commit_message>
<xml_diff>
--- a/docs/presentations/Sage300SDK_2019WebSDKOverview.pptx
+++ b/docs/presentations/Sage300SDK_2019WebSDKOverview.pptx
@@ -5,7 +5,7 @@
     <p:sldMasterId id="2147483660" r:id="rId1"/>
   </p:sldMasterIdLst>
   <p:notesMasterIdLst>
-    <p:notesMasterId r:id="rId17"/>
+    <p:notesMasterId r:id="rId18"/>
   </p:notesMasterIdLst>
   <p:sldIdLst>
     <p:sldId id="257" r:id="rId2"/>
@@ -18,11 +18,12 @@
     <p:sldId id="304" r:id="rId9"/>
     <p:sldId id="305" r:id="rId10"/>
     <p:sldId id="301" r:id="rId11"/>
-    <p:sldId id="271" r:id="rId12"/>
-    <p:sldId id="300" r:id="rId13"/>
-    <p:sldId id="297" r:id="rId14"/>
-    <p:sldId id="298" r:id="rId15"/>
-    <p:sldId id="265" r:id="rId16"/>
+    <p:sldId id="307" r:id="rId12"/>
+    <p:sldId id="271" r:id="rId13"/>
+    <p:sldId id="300" r:id="rId14"/>
+    <p:sldId id="297" r:id="rId15"/>
+    <p:sldId id="298" r:id="rId16"/>
+    <p:sldId id="265" r:id="rId17"/>
   </p:sldIdLst>
   <p:sldSz cx="12192000" cy="6858000"/>
   <p:notesSz cx="6858000" cy="9144000"/>
@@ -211,7 +212,7 @@
           <a:p>
             <a:fld id="{F8DE098C-C2B2-472C-9728-F51906A9149D}" type="datetimeFigureOut">
               <a:rPr lang="en-US" smtClean="0"/>
-              <a:t>8/17/2018</a:t>
+              <a:t>8/20/2018</a:t>
             </a:fld>
             <a:endParaRPr lang="en-US"/>
           </a:p>
@@ -750,7 +751,7 @@
     </p:spTree>
     <p:extLst>
       <p:ext uri="{BB962C8B-B14F-4D97-AF65-F5344CB8AC3E}">
-        <p14:creationId xmlns:p14="http://schemas.microsoft.com/office/powerpoint/2010/main" val="3984031117"/>
+        <p14:creationId xmlns:p14="http://schemas.microsoft.com/office/powerpoint/2010/main" val="1439632955"/>
       </p:ext>
     </p:extLst>
   </p:cSld>
@@ -891,7 +892,7 @@
     </p:spTree>
     <p:extLst>
       <p:ext uri="{BB962C8B-B14F-4D97-AF65-F5344CB8AC3E}">
-        <p14:creationId xmlns:p14="http://schemas.microsoft.com/office/powerpoint/2010/main" val="1942140452"/>
+        <p14:creationId xmlns:p14="http://schemas.microsoft.com/office/powerpoint/2010/main" val="3984031117"/>
       </p:ext>
     </p:extLst>
   </p:cSld>
@@ -1032,7 +1033,7 @@
     </p:spTree>
     <p:extLst>
       <p:ext uri="{BB962C8B-B14F-4D97-AF65-F5344CB8AC3E}">
-        <p14:creationId xmlns:p14="http://schemas.microsoft.com/office/powerpoint/2010/main" val="2789881261"/>
+        <p14:creationId xmlns:p14="http://schemas.microsoft.com/office/powerpoint/2010/main" val="1942140452"/>
       </p:ext>
     </p:extLst>
   </p:cSld>
@@ -1173,7 +1174,7 @@
     </p:spTree>
     <p:extLst>
       <p:ext uri="{BB962C8B-B14F-4D97-AF65-F5344CB8AC3E}">
-        <p14:creationId xmlns:p14="http://schemas.microsoft.com/office/powerpoint/2010/main" val="2222112418"/>
+        <p14:creationId xmlns:p14="http://schemas.microsoft.com/office/powerpoint/2010/main" val="2789881261"/>
       </p:ext>
     </p:extLst>
   </p:cSld>
@@ -1314,6 +1315,147 @@
     </p:spTree>
     <p:extLst>
       <p:ext uri="{BB962C8B-B14F-4D97-AF65-F5344CB8AC3E}">
+        <p14:creationId xmlns:p14="http://schemas.microsoft.com/office/powerpoint/2010/main" val="2222112418"/>
+      </p:ext>
+    </p:extLst>
+  </p:cSld>
+  <p:clrMapOvr>
+    <a:masterClrMapping/>
+  </p:clrMapOvr>
+</p:notes>
+</file>
+
+<file path=ppt/notesSlides/notesSlide15.xml><?xml version="1.0" encoding="utf-8"?>
+<p:notes xmlns:a="http://schemas.openxmlformats.org/drawingml/2006/main" xmlns:r="http://schemas.openxmlformats.org/officeDocument/2006/relationships" xmlns:p="http://schemas.openxmlformats.org/presentationml/2006/main">
+  <p:cSld>
+    <p:spTree>
+      <p:nvGrpSpPr>
+        <p:cNvPr id="1" name=""/>
+        <p:cNvGrpSpPr/>
+        <p:nvPr/>
+      </p:nvGrpSpPr>
+      <p:grpSpPr>
+        <a:xfrm>
+          <a:off x="0" y="0"/>
+          <a:ext cx="0" cy="0"/>
+          <a:chOff x="0" y="0"/>
+          <a:chExt cx="0" cy="0"/>
+        </a:xfrm>
+      </p:grpSpPr>
+      <p:sp>
+        <p:nvSpPr>
+          <p:cNvPr id="2" name="Slide Image Placeholder 1"/>
+          <p:cNvSpPr>
+            <a:spLocks noGrp="1" noRot="1" noChangeAspect="1"/>
+          </p:cNvSpPr>
+          <p:nvPr>
+            <p:ph type="sldImg"/>
+          </p:nvPr>
+        </p:nvSpPr>
+        <p:spPr/>
+      </p:sp>
+      <p:sp>
+        <p:nvSpPr>
+          <p:cNvPr id="3" name="Notes Placeholder 2"/>
+          <p:cNvSpPr>
+            <a:spLocks noGrp="1"/>
+          </p:cNvSpPr>
+          <p:nvPr>
+            <p:ph type="body" idx="1"/>
+          </p:nvPr>
+        </p:nvSpPr>
+        <p:spPr/>
+        <p:txBody>
+          <a:bodyPr/>
+          <a:lstStyle/>
+          <a:p>
+            <a:endParaRPr lang="en-US" dirty="0"/>
+          </a:p>
+          <a:p>
+            <a:endParaRPr lang="en-US" dirty="0"/>
+          </a:p>
+        </p:txBody>
+      </p:sp>
+      <p:sp>
+        <p:nvSpPr>
+          <p:cNvPr id="4" name="Slide Number Placeholder 3"/>
+          <p:cNvSpPr>
+            <a:spLocks noGrp="1"/>
+          </p:cNvSpPr>
+          <p:nvPr>
+            <p:ph type="sldNum" sz="quarter" idx="10"/>
+          </p:nvPr>
+        </p:nvSpPr>
+        <p:spPr/>
+        <p:txBody>
+          <a:bodyPr/>
+          <a:lstStyle/>
+          <a:p>
+            <a:pPr marL="0" marR="0" lvl="0" indent="0" defTabSz="914400" eaLnBrk="1" fontAlgn="auto" latinLnBrk="0" hangingPunct="1">
+              <a:lnSpc>
+                <a:spcPct val="100000"/>
+              </a:lnSpc>
+              <a:spcBef>
+                <a:spcPts val="0"/>
+              </a:spcBef>
+              <a:spcAft>
+                <a:spcPts val="0"/>
+              </a:spcAft>
+              <a:buClrTx/>
+              <a:buSzTx/>
+              <a:buFontTx/>
+              <a:buNone/>
+              <a:tabLst/>
+              <a:defRPr/>
+            </a:pPr>
+            <a:fld id="{AB69E77B-23F2-4D26-B3FA-6109AB5D8139}" type="slidenum">
+              <a:rPr kumimoji="0" lang="en-GB" sz="1800" b="0" i="0" u="none" strike="noStrike" kern="0" cap="none" spc="0" normalizeH="0" baseline="0" noProof="0" smtClean="0">
+                <a:ln>
+                  <a:noFill/>
+                </a:ln>
+                <a:solidFill>
+                  <a:prstClr val="black"/>
+                </a:solidFill>
+                <a:effectLst/>
+                <a:uLnTx/>
+                <a:uFillTx/>
+              </a:rPr>
+              <a:pPr marL="0" marR="0" lvl="0" indent="0" defTabSz="914400" eaLnBrk="1" fontAlgn="auto" latinLnBrk="0" hangingPunct="1">
+                <a:lnSpc>
+                  <a:spcPct val="100000"/>
+                </a:lnSpc>
+                <a:spcBef>
+                  <a:spcPts val="0"/>
+                </a:spcBef>
+                <a:spcAft>
+                  <a:spcPts val="0"/>
+                </a:spcAft>
+                <a:buClrTx/>
+                <a:buSzTx/>
+                <a:buFontTx/>
+                <a:buNone/>
+                <a:tabLst/>
+                <a:defRPr/>
+              </a:pPr>
+              <a:t>16</a:t>
+            </a:fld>
+            <a:endParaRPr kumimoji="0" lang="en-GB" sz="1800" b="0" i="0" u="none" strike="noStrike" kern="0" cap="none" spc="0" normalizeH="0" baseline="0" noProof="0">
+              <a:ln>
+                <a:noFill/>
+              </a:ln>
+              <a:solidFill>
+                <a:prstClr val="black"/>
+              </a:solidFill>
+              <a:effectLst/>
+              <a:uLnTx/>
+              <a:uFillTx/>
+            </a:endParaRPr>
+          </a:p>
+        </p:txBody>
+      </p:sp>
+    </p:spTree>
+    <p:extLst>
+      <p:ext uri="{BB962C8B-B14F-4D97-AF65-F5344CB8AC3E}">
         <p14:creationId xmlns:p14="http://schemas.microsoft.com/office/powerpoint/2010/main" val="250796128"/>
       </p:ext>
     </p:extLst>
@@ -2548,7 +2690,7 @@
                 </a:solidFill>
               </a:rPr>
               <a:pPr/>
-              <a:t>2018/08/17</a:t>
+              <a:t>2018/08/20</a:t>
             </a:fld>
             <a:endParaRPr lang="en-US">
               <a:solidFill>
@@ -2853,7 +2995,7 @@
                 </a:solidFill>
               </a:rPr>
               <a:pPr/>
-              <a:t>2018/08/17</a:t>
+              <a:t>2018/08/20</a:t>
             </a:fld>
             <a:endParaRPr lang="en-US">
               <a:solidFill>
@@ -3090,7 +3232,7 @@
             <a:fld id="{EE1C84F4-270C-2249-89D9-A705BDADDAAB}" type="datetime1">
               <a:rPr lang="en-ZA" smtClean="0"/>
               <a:pPr/>
-              <a:t>2018/08/17</a:t>
+              <a:t>2018/08/20</a:t>
             </a:fld>
             <a:endParaRPr lang="en-US"/>
           </a:p>
@@ -3429,7 +3571,7 @@
             <a:fld id="{2AE6851E-022E-D141-8BE0-1745E9557F71}" type="datetime1">
               <a:rPr lang="en-ZA" smtClean="0"/>
               <a:pPr/>
-              <a:t>2018/08/17</a:t>
+              <a:t>2018/08/20</a:t>
             </a:fld>
             <a:endParaRPr lang="en-US"/>
           </a:p>
@@ -4177,6 +4319,100 @@
           <a:p>
             <a:r>
               <a:rPr lang="en-US" dirty="0"/>
+              <a:t>Merge ISV Project</a:t>
+            </a:r>
+          </a:p>
+        </p:txBody>
+      </p:sp>
+      <p:sp>
+        <p:nvSpPr>
+          <p:cNvPr id="12" name="Content Placeholder 4"/>
+          <p:cNvSpPr>
+            <a:spLocks noGrp="1"/>
+          </p:cNvSpPr>
+          <p:nvPr>
+            <p:ph idx="1"/>
+          </p:nvPr>
+        </p:nvSpPr>
+        <p:spPr>
+          <a:xfrm>
+            <a:off x="466025" y="1366944"/>
+            <a:ext cx="11571077" cy="5008456"/>
+          </a:xfrm>
+        </p:spPr>
+        <p:txBody>
+          <a:bodyPr numCol="1"/>
+          <a:lstStyle/>
+          <a:p>
+            <a:pPr lvl="1"/>
+            <a:r>
+              <a:rPr lang="en-US" sz="2000" dirty="0"/>
+              <a:t>WebGrease cannot minify subfolders in a single call and thus need to iterate folders</a:t>
+            </a:r>
+          </a:p>
+          <a:p>
+            <a:pPr lvl="2"/>
+            <a:r>
+              <a:rPr lang="en-US" sz="1800" dirty="0"/>
+              <a:t>Solution and Upgrade Wizards modified</a:t>
+            </a:r>
+          </a:p>
+          <a:p>
+            <a:pPr lvl="2"/>
+            <a:r>
+              <a:rPr lang="en-US" sz="1800" dirty="0"/>
+              <a:t>Samples use MergeISVProject executable from bin\utilities folder</a:t>
+            </a:r>
+          </a:p>
+        </p:txBody>
+      </p:sp>
+    </p:spTree>
+    <p:extLst>
+      <p:ext uri="{BB962C8B-B14F-4D97-AF65-F5344CB8AC3E}">
+        <p14:creationId xmlns:p14="http://schemas.microsoft.com/office/powerpoint/2010/main" val="852043990"/>
+      </p:ext>
+    </p:extLst>
+  </p:cSld>
+  <p:clrMapOvr>
+    <a:masterClrMapping/>
+  </p:clrMapOvr>
+</p:sld>
+</file>
+
+<file path=ppt/slides/slide12.xml><?xml version="1.0" encoding="utf-8"?>
+<p:sld xmlns:a="http://schemas.openxmlformats.org/drawingml/2006/main" xmlns:r="http://schemas.openxmlformats.org/officeDocument/2006/relationships" xmlns:p="http://schemas.openxmlformats.org/presentationml/2006/main">
+  <p:cSld>
+    <p:spTree>
+      <p:nvGrpSpPr>
+        <p:cNvPr id="1" name=""/>
+        <p:cNvGrpSpPr/>
+        <p:nvPr/>
+      </p:nvGrpSpPr>
+      <p:grpSpPr>
+        <a:xfrm>
+          <a:off x="0" y="0"/>
+          <a:ext cx="0" cy="0"/>
+          <a:chOff x="0" y="0"/>
+          <a:chExt cx="0" cy="0"/>
+        </a:xfrm>
+      </p:grpSpPr>
+      <p:sp>
+        <p:nvSpPr>
+          <p:cNvPr id="8" name="Title 7"/>
+          <p:cNvSpPr>
+            <a:spLocks noGrp="1"/>
+          </p:cNvSpPr>
+          <p:nvPr>
+            <p:ph type="title"/>
+          </p:nvPr>
+        </p:nvSpPr>
+        <p:spPr/>
+        <p:txBody>
+          <a:bodyPr/>
+          <a:lstStyle/>
+          <a:p>
+            <a:r>
+              <a:rPr lang="en-US" dirty="0"/>
               <a:t>Documentation</a:t>
             </a:r>
           </a:p>
@@ -4301,7 +4537,7 @@
 </p:sld>
 </file>
 
-<file path=ppt/slides/slide12.xml><?xml version="1.0" encoding="utf-8"?>
+<file path=ppt/slides/slide13.xml><?xml version="1.0" encoding="utf-8"?>
 <p:sld xmlns:a="http://schemas.openxmlformats.org/drawingml/2006/main" xmlns:r="http://schemas.openxmlformats.org/officeDocument/2006/relationships" xmlns:p="http://schemas.openxmlformats.org/presentationml/2006/main">
   <p:cSld>
     <p:spTree>
@@ -4462,7 +4698,7 @@
 </p:sld>
 </file>
 
-<file path=ppt/slides/slide13.xml><?xml version="1.0" encoding="utf-8"?>
+<file path=ppt/slides/slide14.xml><?xml version="1.0" encoding="utf-8"?>
 <p:sld xmlns:a="http://schemas.openxmlformats.org/drawingml/2006/main" xmlns:r="http://schemas.openxmlformats.org/officeDocument/2006/relationships" xmlns:p="http://schemas.openxmlformats.org/presentationml/2006/main">
   <p:cSld>
     <p:spTree>
@@ -4557,7 +4793,7 @@
 </p:sld>
 </file>
 
-<file path=ppt/slides/slide14.xml><?xml version="1.0" encoding="utf-8"?>
+<file path=ppt/slides/slide15.xml><?xml version="1.0" encoding="utf-8"?>
 <p:sld xmlns:a="http://schemas.openxmlformats.org/drawingml/2006/main" xmlns:r="http://schemas.openxmlformats.org/officeDocument/2006/relationships" xmlns:p="http://schemas.openxmlformats.org/presentationml/2006/main">
   <p:cSld>
     <p:spTree>
@@ -4787,7 +5023,7 @@
 </p:sld>
 </file>
 
-<file path=ppt/slides/slide15.xml><?xml version="1.0" encoding="utf-8"?>
+<file path=ppt/slides/slide16.xml><?xml version="1.0" encoding="utf-8"?>
 <p:sld xmlns:a="http://schemas.openxmlformats.org/drawingml/2006/main" xmlns:r="http://schemas.openxmlformats.org/officeDocument/2006/relationships" xmlns:p="http://schemas.openxmlformats.org/presentationml/2006/main">
   <p:cSld>
     <p:spTree>
@@ -5676,7 +5912,7 @@
         </p:nvSpPr>
         <p:spPr>
           <a:xfrm>
-            <a:off x="466025" y="1366944"/>
+            <a:off x="487680" y="924772"/>
             <a:ext cx="11571077" cy="5008456"/>
           </a:xfrm>
         </p:spPr>
@@ -5802,15 +6038,14 @@
             </a:r>
             <a:r>
               <a:rPr lang="en-US" sz="2000" dirty="0"/>
-              <a:t>’ folder added to Web project for Reports to work </a:t>
-            </a:r>
-            <a:r>
-              <a:rPr lang="en-US" sz="2000"/>
-              <a:t>in Debug </a:t>
-            </a:r>
+              <a:t>’ folder added to Web project for Reports to work in Debug mode</a:t>
+            </a:r>
+          </a:p>
+          <a:p>
+            <a:pPr lvl="1"/>
             <a:r>
               <a:rPr lang="en-US" sz="2000" dirty="0"/>
-              <a:t>mode</a:t>
+              <a:t>Updated MergeISVProject to reflect Minify JavaScript changes</a:t>
             </a:r>
           </a:p>
         </p:txBody>
@@ -6337,6 +6572,17 @@
               <a:rPr lang="en-US" sz="2000" dirty="0"/>
               <a:t>’ folder added, if not exists, to Web folder for Reports to work in Debug mode</a:t>
             </a:r>
+          </a:p>
+          <a:p>
+            <a:pPr lvl="1"/>
+            <a:r>
+              <a:rPr lang="en-US" sz="2000" dirty="0"/>
+              <a:t>Updated MergeISVProject to reflect Minify JavaScript changes</a:t>
+            </a:r>
+          </a:p>
+          <a:p>
+            <a:pPr lvl="1"/>
+            <a:endParaRPr lang="en-US" sz="2000" dirty="0"/>
           </a:p>
           <a:p>
             <a:pPr lvl="1"/>

</xml_diff>